<commit_message>
Update comments in the presentation
</commit_message>
<xml_diff>
--- a/documents/presentations/CDppt(7)_week13_윤신영.pptx
+++ b/documents/presentations/CDppt(7)_week13_윤신영.pptx
@@ -516,6 +516,42 @@
           <a:bodyPr/>
           <a:lstStyle/>
           <a:p>
+            <a:r>
+              <a:rPr lang="ko-KR" altLang="en-US" dirty="0" smtClean="0"/>
+              <a:t>피드백</a:t>
+            </a:r>
+            <a:r>
+              <a:rPr lang="en-US" altLang="ko-KR" dirty="0" smtClean="0"/>
+              <a:t>: </a:t>
+            </a:r>
+            <a:r>
+              <a:rPr lang="ko-KR" altLang="en-US" dirty="0" smtClean="0"/>
+              <a:t>지난 주에 좋은 피드백을 주셨는데요</a:t>
+            </a:r>
+            <a:r>
+              <a:rPr lang="en-US" altLang="ko-KR" dirty="0" smtClean="0"/>
+              <a:t>, </a:t>
+            </a:r>
+            <a:r>
+              <a:rPr lang="ko-KR" altLang="en-US" dirty="0" smtClean="0"/>
+              <a:t>여기 작품 상세 페이지에서 구독</a:t>
+            </a:r>
+            <a:r>
+              <a:rPr lang="ko-KR" altLang="en-US" baseline="0" dirty="0" smtClean="0"/>
+              <a:t> 버튼을 누르면 숨김 버튼이 사라지고</a:t>
+            </a:r>
+            <a:r>
+              <a:rPr lang="en-US" altLang="ko-KR" baseline="0" dirty="0" smtClean="0"/>
+              <a:t>, </a:t>
+            </a:r>
+            <a:r>
+              <a:rPr lang="ko-KR" altLang="en-US" baseline="0" dirty="0" smtClean="0"/>
+              <a:t>숨김 버튼을 누르면 구독 버튼이 사라집니다</a:t>
+            </a:r>
+            <a:r>
+              <a:rPr lang="en-US" altLang="ko-KR" baseline="0" dirty="0" smtClean="0"/>
+              <a:t>.</a:t>
+            </a:r>
             <a:endParaRPr lang="ko-KR" altLang="en-US" dirty="0"/>
           </a:p>
         </p:txBody>
@@ -600,6 +636,46 @@
           <a:bodyPr/>
           <a:lstStyle/>
           <a:p>
+            <a:r>
+              <a:rPr lang="ko-KR" altLang="en-US" dirty="0" smtClean="0"/>
+              <a:t>다음은 안드로이드와 </a:t>
+            </a:r>
+            <a:r>
+              <a:rPr lang="en-US" altLang="ko-KR" dirty="0" smtClean="0"/>
+              <a:t>DB, </a:t>
+            </a:r>
+            <a:r>
+              <a:rPr lang="ko-KR" altLang="en-US" dirty="0" smtClean="0"/>
+              <a:t>서버 진행 상황입니다</a:t>
+            </a:r>
+            <a:r>
+              <a:rPr lang="en-US" altLang="ko-KR" dirty="0" smtClean="0"/>
+              <a:t>. </a:t>
+            </a:r>
+            <a:r>
+              <a:rPr lang="ko-KR" altLang="en-US" dirty="0" smtClean="0"/>
+              <a:t>앞서 피드백에서 말씀 드렸던 것과 마찬가지로</a:t>
+            </a:r>
+            <a:r>
+              <a:rPr lang="en-US" altLang="ko-KR" dirty="0" smtClean="0"/>
+              <a:t>, </a:t>
+            </a:r>
+            <a:r>
+              <a:rPr lang="ko-KR" altLang="en-US" dirty="0" smtClean="0"/>
+              <a:t>작품 상세 페이지에서 구독 버튼을 눌러서 구독에 성공하면 숨김 버튼이 사라지게 하고</a:t>
+            </a:r>
+            <a:r>
+              <a:rPr lang="en-US" altLang="ko-KR" dirty="0" smtClean="0"/>
+              <a:t>, </a:t>
+            </a:r>
+            <a:r>
+              <a:rPr lang="ko-KR" altLang="en-US" dirty="0" smtClean="0"/>
+              <a:t>그 반대의 경우도 가능하게 했습니다</a:t>
+            </a:r>
+            <a:r>
+              <a:rPr lang="en-US" altLang="ko-KR" dirty="0" smtClean="0"/>
+              <a:t>.</a:t>
+            </a:r>
             <a:endParaRPr lang="ko-KR" altLang="en-US" dirty="0"/>
           </a:p>
         </p:txBody>
@@ -684,6 +760,66 @@
           <a:bodyPr/>
           <a:lstStyle/>
           <a:p>
+            <a:r>
+              <a:rPr lang="ko-KR" altLang="en-US" dirty="0" smtClean="0"/>
+              <a:t>다음은 </a:t>
+            </a:r>
+            <a:r>
+              <a:rPr lang="ko-KR" altLang="en-US" dirty="0" err="1" smtClean="0"/>
+              <a:t>북마크</a:t>
+            </a:r>
+            <a:r>
+              <a:rPr lang="ko-KR" altLang="en-US" dirty="0" smtClean="0"/>
+              <a:t> 기능입니다</a:t>
+            </a:r>
+            <a:r>
+              <a:rPr lang="en-US" altLang="ko-KR" dirty="0" smtClean="0"/>
+              <a:t>. </a:t>
+            </a:r>
+            <a:r>
+              <a:rPr lang="ko-KR" altLang="en-US" dirty="0" smtClean="0"/>
+              <a:t>지난주에 아이콘이 두루마리 </a:t>
+            </a:r>
+            <a:r>
+              <a:rPr lang="ko-KR" altLang="en-US" dirty="0" err="1" smtClean="0"/>
+              <a:t>휴지같다는</a:t>
+            </a:r>
+            <a:r>
+              <a:rPr lang="ko-KR" altLang="en-US" dirty="0" smtClean="0"/>
+              <a:t> 피드백을 </a:t>
+            </a:r>
+            <a:r>
+              <a:rPr lang="ko-KR" altLang="en-US" dirty="0" err="1" smtClean="0"/>
+              <a:t>주셨어서</a:t>
+            </a:r>
+            <a:r>
+              <a:rPr lang="ko-KR" altLang="en-US" dirty="0" smtClean="0"/>
+              <a:t> 아이콘을 바꿨습니다</a:t>
+            </a:r>
+            <a:r>
+              <a:rPr lang="en-US" altLang="ko-KR" dirty="0" smtClean="0"/>
+              <a:t>. </a:t>
+            </a:r>
+            <a:r>
+              <a:rPr lang="ko-KR" altLang="en-US" dirty="0" smtClean="0"/>
+              <a:t>다음과</a:t>
+            </a:r>
+            <a:r>
+              <a:rPr lang="ko-KR" altLang="en-US" baseline="0" dirty="0" smtClean="0"/>
+              <a:t> 같이 에피소드 </a:t>
+            </a:r>
+            <a:r>
+              <a:rPr lang="ko-KR" altLang="en-US" baseline="0" dirty="0" err="1" smtClean="0"/>
+              <a:t>썸네일</a:t>
+            </a:r>
+            <a:r>
+              <a:rPr lang="ko-KR" altLang="en-US" baseline="0" dirty="0" smtClean="0"/>
+              <a:t> 왼쪽에 있는 책갈피 아이콘을 클릭하여 책갈피 등록에 성공하면 오른쪽과 같이 책갈피 아이콘이 변합니다</a:t>
+            </a:r>
+            <a:r>
+              <a:rPr lang="en-US" altLang="ko-KR" baseline="0" dirty="0" smtClean="0"/>
+              <a:t>.</a:t>
+            </a:r>
             <a:endParaRPr lang="ko-KR" altLang="en-US" dirty="0"/>
           </a:p>
         </p:txBody>
@@ -768,6 +904,22 @@
           <a:bodyPr/>
           <a:lstStyle/>
           <a:p>
+            <a:r>
+              <a:rPr lang="ko-KR" altLang="en-US" dirty="0" smtClean="0"/>
+              <a:t>이렇게 등록된 책갈피는 </a:t>
+            </a:r>
+            <a:r>
+              <a:rPr lang="ko-KR" altLang="en-US" dirty="0" err="1" smtClean="0"/>
+              <a:t>마이페이지에서도</a:t>
+            </a:r>
+            <a:r>
+              <a:rPr lang="ko-KR" altLang="en-US" dirty="0" smtClean="0"/>
+              <a:t> 볼 수 있습니다</a:t>
+            </a:r>
+            <a:r>
+              <a:rPr lang="en-US" altLang="ko-KR" dirty="0" smtClean="0"/>
+              <a:t>.</a:t>
+            </a:r>
             <a:endParaRPr lang="ko-KR" altLang="en-US" dirty="0"/>
           </a:p>
         </p:txBody>
@@ -852,6 +1004,22 @@
           <a:bodyPr/>
           <a:lstStyle/>
           <a:p>
+            <a:r>
+              <a:rPr lang="ko-KR" altLang="en-US" dirty="0" smtClean="0"/>
+              <a:t>작품 상세페이지에서 각 에피소드를 클릭하면 해당 에피소드 </a:t>
+            </a:r>
+            <a:r>
+              <a:rPr lang="en-US" altLang="ko-KR" dirty="0" err="1" smtClean="0"/>
+              <a:t>url</a:t>
+            </a:r>
+            <a:r>
+              <a:rPr lang="ko-KR" altLang="en-US" dirty="0" smtClean="0"/>
+              <a:t>에 해당되는 페이지로 이동합니다</a:t>
+            </a:r>
+            <a:r>
+              <a:rPr lang="en-US" altLang="ko-KR" dirty="0" smtClean="0"/>
+              <a:t>.</a:t>
+            </a:r>
             <a:endParaRPr lang="ko-KR" altLang="en-US" dirty="0"/>
           </a:p>
         </p:txBody>
@@ -936,6 +1104,62 @@
           <a:bodyPr/>
           <a:lstStyle/>
           <a:p>
+            <a:r>
+              <a:rPr lang="ko-KR" altLang="en-US" dirty="0" smtClean="0"/>
+              <a:t>다음은 통합 검색 기능입니다</a:t>
+            </a:r>
+            <a:r>
+              <a:rPr lang="en-US" altLang="ko-KR" dirty="0" smtClean="0"/>
+              <a:t>. </a:t>
+            </a:r>
+            <a:r>
+              <a:rPr lang="ko-KR" altLang="en-US" dirty="0" smtClean="0"/>
+              <a:t>다음과 같이 </a:t>
+            </a:r>
+            <a:r>
+              <a:rPr lang="en-US" altLang="ko-KR" dirty="0" smtClean="0"/>
+              <a:t>‘</a:t>
+            </a:r>
+            <a:r>
+              <a:rPr lang="ko-KR" altLang="en-US" dirty="0" smtClean="0"/>
+              <a:t>일기</a:t>
+            </a:r>
+            <a:r>
+              <a:rPr lang="en-US" altLang="ko-KR" dirty="0" smtClean="0"/>
+              <a:t>‘, ‘</a:t>
+            </a:r>
+            <a:r>
+              <a:rPr lang="ko-KR" altLang="en-US" dirty="0" smtClean="0"/>
+              <a:t>신의</a:t>
+            </a:r>
+            <a:r>
+              <a:rPr lang="en-US" altLang="ko-KR" dirty="0" smtClean="0"/>
+              <a:t>‘ </a:t>
+            </a:r>
+            <a:r>
+              <a:rPr lang="ko-KR" altLang="en-US" dirty="0" smtClean="0"/>
+              <a:t>같은 특정 단어를 검색하면 해당 단어가 </a:t>
+            </a:r>
+            <a:r>
+              <a:rPr lang="ko-KR" altLang="en-US" dirty="0" err="1" smtClean="0"/>
+              <a:t>작품명이나</a:t>
+            </a:r>
+            <a:r>
+              <a:rPr lang="ko-KR" altLang="en-US" dirty="0" smtClean="0"/>
+              <a:t> </a:t>
+            </a:r>
+            <a:r>
+              <a:rPr lang="ko-KR" altLang="en-US" dirty="0" err="1" smtClean="0"/>
+              <a:t>작가명에</a:t>
+            </a:r>
+            <a:r>
+              <a:rPr lang="ko-KR" altLang="en-US" dirty="0" smtClean="0"/>
+              <a:t> 포함된 웹툰들이 검색 결과로 나타납니다</a:t>
+            </a:r>
+            <a:r>
+              <a:rPr lang="en-US" altLang="ko-KR" dirty="0" smtClean="0"/>
+              <a:t>.</a:t>
+            </a:r>
             <a:endParaRPr lang="ko-KR" altLang="en-US" dirty="0"/>
           </a:p>
         </p:txBody>
@@ -1020,6 +1244,46 @@
           <a:bodyPr/>
           <a:lstStyle/>
           <a:p>
+            <a:r>
+              <a:rPr lang="ko-KR" altLang="en-US" dirty="0" smtClean="0"/>
+              <a:t>다음은 추천을 위한 유저의 선호 장르 선택 기능입니다</a:t>
+            </a:r>
+            <a:r>
+              <a:rPr lang="en-US" altLang="ko-KR" dirty="0" smtClean="0"/>
+              <a:t>. </a:t>
+            </a:r>
+            <a:r>
+              <a:rPr lang="ko-KR" altLang="en-US" dirty="0" smtClean="0"/>
+              <a:t>회원 가입 시에 </a:t>
+            </a:r>
+            <a:r>
+              <a:rPr lang="ko-KR" altLang="en-US" dirty="0" err="1" smtClean="0"/>
+              <a:t>이런식으로</a:t>
+            </a:r>
+            <a:r>
+              <a:rPr lang="ko-KR" altLang="en-US" dirty="0" smtClean="0"/>
+              <a:t> 취향을 </a:t>
+            </a:r>
+            <a:r>
+              <a:rPr lang="en-US" altLang="ko-KR" dirty="0" smtClean="0"/>
+              <a:t>3</a:t>
+            </a:r>
+            <a:r>
+              <a:rPr lang="ko-KR" altLang="en-US" dirty="0" smtClean="0"/>
+              <a:t>가지 이상 </a:t>
+            </a:r>
+            <a:r>
+              <a:rPr lang="ko-KR" altLang="en-US" dirty="0" err="1" smtClean="0"/>
+              <a:t>선택받게</a:t>
+            </a:r>
+            <a:r>
+              <a:rPr lang="ko-KR" altLang="en-US" dirty="0" smtClean="0"/>
+              <a:t> 됩니다</a:t>
+            </a:r>
+            <a:r>
+              <a:rPr lang="en-US" altLang="ko-KR" dirty="0" smtClean="0"/>
+              <a:t>.</a:t>
+            </a:r>
             <a:endParaRPr lang="ko-KR" altLang="en-US" dirty="0"/>
           </a:p>
         </p:txBody>
@@ -1104,6 +1368,50 @@
           <a:bodyPr/>
           <a:lstStyle/>
           <a:p>
+            <a:r>
+              <a:rPr lang="ko-KR" altLang="en-US" dirty="0" smtClean="0"/>
+              <a:t>이렇게 선택한 장르와</a:t>
+            </a:r>
+            <a:r>
+              <a:rPr lang="en-US" altLang="ko-KR" dirty="0" smtClean="0"/>
+              <a:t>, </a:t>
+            </a:r>
+            <a:r>
+              <a:rPr lang="ko-KR" altLang="en-US" dirty="0" smtClean="0"/>
+              <a:t>구독</a:t>
+            </a:r>
+            <a:r>
+              <a:rPr lang="en-US" altLang="ko-KR" dirty="0" smtClean="0"/>
+              <a:t>,</a:t>
+            </a:r>
+            <a:r>
+              <a:rPr lang="en-US" altLang="ko-KR" baseline="0" dirty="0" smtClean="0"/>
+              <a:t> </a:t>
+            </a:r>
+            <a:r>
+              <a:rPr lang="ko-KR" altLang="en-US" baseline="0" dirty="0" smtClean="0"/>
+              <a:t>숨김</a:t>
+            </a:r>
+            <a:r>
+              <a:rPr lang="en-US" altLang="ko-KR" baseline="0" dirty="0" smtClean="0"/>
+              <a:t>, </a:t>
+            </a:r>
+            <a:r>
+              <a:rPr lang="ko-KR" altLang="en-US" baseline="0" dirty="0" smtClean="0"/>
+              <a:t>책갈피</a:t>
+            </a:r>
+            <a:r>
+              <a:rPr lang="en-US" altLang="ko-KR" baseline="0" dirty="0" smtClean="0"/>
+              <a:t>, </a:t>
+            </a:r>
+            <a:r>
+              <a:rPr lang="ko-KR" altLang="en-US" baseline="0" dirty="0" smtClean="0"/>
+              <a:t>메모 등을 바탕으로 각 장르에 대한 선호도가 계산되어 이와 같은 그래프로 나타납니다</a:t>
+            </a:r>
+            <a:r>
+              <a:rPr lang="en-US" altLang="ko-KR" baseline="0" dirty="0" smtClean="0"/>
+              <a:t>.</a:t>
+            </a:r>
             <a:endParaRPr lang="ko-KR" altLang="en-US" dirty="0"/>
           </a:p>
         </p:txBody>
@@ -1188,6 +1496,34 @@
           <a:bodyPr/>
           <a:lstStyle/>
           <a:p>
+            <a:r>
+              <a:rPr lang="ko-KR" altLang="en-US" dirty="0" smtClean="0"/>
+              <a:t>그리고 이 중 상위 </a:t>
+            </a:r>
+            <a:r>
+              <a:rPr lang="en-US" altLang="ko-KR" dirty="0" smtClean="0"/>
+              <a:t>3</a:t>
+            </a:r>
+            <a:r>
+              <a:rPr lang="ko-KR" altLang="en-US" dirty="0" smtClean="0"/>
+              <a:t>장르에 대해서는</a:t>
+            </a:r>
+            <a:r>
+              <a:rPr lang="ko-KR" altLang="en-US" baseline="0" dirty="0" smtClean="0"/>
+              <a:t> 각 장르마다 </a:t>
+            </a:r>
+            <a:r>
+              <a:rPr lang="en-US" altLang="ko-KR" baseline="0" dirty="0" smtClean="0"/>
+              <a:t>1</a:t>
+            </a:r>
+            <a:r>
+              <a:rPr lang="ko-KR" altLang="en-US" baseline="0" dirty="0" smtClean="0"/>
+              <a:t>개의 작품씩 추천을 받게 됩니다</a:t>
+            </a:r>
+            <a:r>
+              <a:rPr lang="en-US" altLang="ko-KR" baseline="0" dirty="0" smtClean="0"/>
+              <a:t>.</a:t>
+            </a:r>
             <a:endParaRPr lang="ko-KR" altLang="en-US" dirty="0"/>
           </a:p>
         </p:txBody>
@@ -6365,18 +6701,7 @@
                 <a:ea typeface="HY헤드라인M" panose="02030600000101010101" pitchFamily="18" charset="-127"/>
                 <a:cs typeface="Aharoni" panose="02010803020104030203" pitchFamily="2" charset="-79"/>
               </a:rPr>
-              <a:t>마이</a:t>
-            </a:r>
-            <a:r>
-              <a:rPr lang="ko-KR" altLang="en-US" sz="2800" b="1" dirty="0" smtClean="0">
-                <a:solidFill>
-                  <a:srgbClr val="232124"/>
-                </a:solidFill>
-                <a:latin typeface="HY헤드라인M" panose="02030600000101010101" pitchFamily="18" charset="-127"/>
-                <a:ea typeface="HY헤드라인M" panose="02030600000101010101" pitchFamily="18" charset="-127"/>
-                <a:cs typeface="Aharoni" panose="02010803020104030203" pitchFamily="2" charset="-79"/>
-              </a:rPr>
-              <a:t> 페이지 </a:t>
+              <a:t>마이 페이지 </a:t>
             </a:r>
             <a:r>
               <a:rPr lang="ko-KR" altLang="en-US" sz="2800" b="1" dirty="0" err="1" smtClean="0">

</xml_diff>